<commit_message>
Exercises first 3 lessons
</commit_message>
<xml_diff>
--- a/Lessons/Jaar 2/Lesson 1/Lesson 1.pptx
+++ b/Lessons/Jaar 2/Lesson 1/Lesson 1.pptx
@@ -246,7 +246,7 @@
           <a:p>
             <a:fld id="{6307FBA3-C1DE-4114-8F2E-27DE21EA19B1}" type="datetimeFigureOut">
               <a:rPr lang="en-US" smtClean="0"/>
-              <a:t>12/5/2019</a:t>
+              <a:t>12/15/2019</a:t>
             </a:fld>
             <a:endParaRPr lang="en-US"/>
           </a:p>
@@ -745,7 +745,7 @@
           <a:p>
             <a:fld id="{20CB5ABA-A31F-4730-B3FC-C2C80B92D381}" type="datetimeFigureOut">
               <a:rPr lang="nl-NL" smtClean="0"/>
-              <a:t>5-12-2019</a:t>
+              <a:t>15-12-2019</a:t>
             </a:fld>
             <a:endParaRPr lang="nl-NL" dirty="0"/>
           </a:p>
@@ -943,7 +943,7 @@
           <a:p>
             <a:fld id="{20CB5ABA-A31F-4730-B3FC-C2C80B92D381}" type="datetimeFigureOut">
               <a:rPr lang="nl-NL" smtClean="0"/>
-              <a:t>5-12-2019</a:t>
+              <a:t>15-12-2019</a:t>
             </a:fld>
             <a:endParaRPr lang="nl-NL" dirty="0"/>
           </a:p>
@@ -1151,7 +1151,7 @@
           <a:p>
             <a:fld id="{20CB5ABA-A31F-4730-B3FC-C2C80B92D381}" type="datetimeFigureOut">
               <a:rPr lang="nl-NL" smtClean="0"/>
-              <a:t>5-12-2019</a:t>
+              <a:t>15-12-2019</a:t>
             </a:fld>
             <a:endParaRPr lang="nl-NL" dirty="0"/>
           </a:p>
@@ -1511,7 +1511,7 @@
           <a:p>
             <a:fld id="{20CB5ABA-A31F-4730-B3FC-C2C80B92D381}" type="datetimeFigureOut">
               <a:rPr lang="nl-NL" smtClean="0"/>
-              <a:t>5-12-2019</a:t>
+              <a:t>15-12-2019</a:t>
             </a:fld>
             <a:endParaRPr lang="nl-NL" dirty="0"/>
           </a:p>
@@ -1786,7 +1786,7 @@
           <a:p>
             <a:fld id="{20CB5ABA-A31F-4730-B3FC-C2C80B92D381}" type="datetimeFigureOut">
               <a:rPr lang="nl-NL" smtClean="0"/>
-              <a:t>5-12-2019</a:t>
+              <a:t>15-12-2019</a:t>
             </a:fld>
             <a:endParaRPr lang="nl-NL" dirty="0"/>
           </a:p>
@@ -2051,7 +2051,7 @@
           <a:p>
             <a:fld id="{20CB5ABA-A31F-4730-B3FC-C2C80B92D381}" type="datetimeFigureOut">
               <a:rPr lang="nl-NL" smtClean="0"/>
-              <a:t>5-12-2019</a:t>
+              <a:t>15-12-2019</a:t>
             </a:fld>
             <a:endParaRPr lang="nl-NL" dirty="0"/>
           </a:p>
@@ -2463,7 +2463,7 @@
           <a:p>
             <a:fld id="{20CB5ABA-A31F-4730-B3FC-C2C80B92D381}" type="datetimeFigureOut">
               <a:rPr lang="nl-NL" smtClean="0"/>
-              <a:t>5-12-2019</a:t>
+              <a:t>15-12-2019</a:t>
             </a:fld>
             <a:endParaRPr lang="nl-NL" dirty="0"/>
           </a:p>
@@ -2604,7 +2604,7 @@
           <a:p>
             <a:fld id="{20CB5ABA-A31F-4730-B3FC-C2C80B92D381}" type="datetimeFigureOut">
               <a:rPr lang="nl-NL" smtClean="0"/>
-              <a:t>5-12-2019</a:t>
+              <a:t>15-12-2019</a:t>
             </a:fld>
             <a:endParaRPr lang="nl-NL" dirty="0"/>
           </a:p>
@@ -2717,7 +2717,7 @@
           <a:p>
             <a:fld id="{20CB5ABA-A31F-4730-B3FC-C2C80B92D381}" type="datetimeFigureOut">
               <a:rPr lang="nl-NL" smtClean="0"/>
-              <a:t>5-12-2019</a:t>
+              <a:t>15-12-2019</a:t>
             </a:fld>
             <a:endParaRPr lang="nl-NL" dirty="0"/>
           </a:p>
@@ -3028,7 +3028,7 @@
           <a:p>
             <a:fld id="{20CB5ABA-A31F-4730-B3FC-C2C80B92D381}" type="datetimeFigureOut">
               <a:rPr lang="nl-NL" smtClean="0"/>
-              <a:t>5-12-2019</a:t>
+              <a:t>15-12-2019</a:t>
             </a:fld>
             <a:endParaRPr lang="nl-NL" dirty="0"/>
           </a:p>
@@ -3316,7 +3316,7 @@
           <a:p>
             <a:fld id="{20CB5ABA-A31F-4730-B3FC-C2C80B92D381}" type="datetimeFigureOut">
               <a:rPr lang="nl-NL" smtClean="0"/>
-              <a:t>5-12-2019</a:t>
+              <a:t>15-12-2019</a:t>
             </a:fld>
             <a:endParaRPr lang="nl-NL" dirty="0"/>
           </a:p>
@@ -3557,7 +3557,7 @@
           <a:p>
             <a:fld id="{20CB5ABA-A31F-4730-B3FC-C2C80B92D381}" type="datetimeFigureOut">
               <a:rPr lang="nl-NL" smtClean="0"/>
-              <a:t>5-12-2019</a:t>
+              <a:t>15-12-2019</a:t>
             </a:fld>
             <a:endParaRPr lang="nl-NL" dirty="0"/>
           </a:p>
@@ -6554,7 +6554,7 @@
               <a:rPr lang="en-US" dirty="0">
                 <a:latin typeface="+mj-lt"/>
               </a:rPr>
-              <a:t>Calculator 25 min </a:t>
+              <a:t>Calculator</a:t>
             </a:r>
           </a:p>
         </p:txBody>
@@ -7535,7 +7535,7 @@
               <a:rPr lang="en-US" dirty="0">
                 <a:latin typeface="+mj-lt"/>
               </a:rPr>
-              <a:t>Assignment build the calculator (25 min)</a:t>
+              <a:t>Assignment build the calculator</a:t>
             </a:r>
           </a:p>
         </p:txBody>

</xml_diff>